<commit_message>
Blue alliance & TeleOp Preset Codes
Blue alliance & TeleOp Preset Codes
</commit_message>
<xml_diff>
--- a/ProgrammingDocs/Gamepad_AT_2022.pptx
+++ b/ProgrammingDocs/Gamepad_AT_2022.pptx
@@ -247,7 +247,7 @@
       <p15:sldGuideLst xmlns:p15="http://schemas.microsoft.com/office/powerpoint/2012/main"/>
     </p:ext>
     <p:ext uri="http://customooxmlschemas.google.com/">
-      <go:slidesCustomData xmlns="" xmlns:mc="http://schemas.openxmlformats.org/markup-compatibility/2006" xmlns:mv="urn:schemas-microsoft-com:mac:vml" xmlns:c="http://schemas.openxmlformats.org/drawingml/2006/chart" xmlns:dgm="http://schemas.openxmlformats.org/drawingml/2006/diagram" xmlns:o="urn:schemas-microsoft-com:office:office" xmlns:v="urn:schemas-microsoft-com:vml" xmlns:pvml="urn:schemas-microsoft-com:office:powerpoint" xmlns:com="http://schemas.openxmlformats.org/drawingml/2006/compatibility" xmlns:p14="http://schemas.microsoft.com/office/powerpoint/2010/main" xmlns:p15="http://schemas.microsoft.com/office/powerpoint/2012/main" xmlns:ahyp="http://schemas.microsoft.com/office/drawing/2018/hyperlinkcolor" xmlns:go="http://customooxmlschemas.google.com/" r:id="rId9" roundtripDataSignature="AMtx7mg7/Uy38vozo7lv7lODiH/+yduhyA=="/>
+      <go:slidesCustomData xmlns:go="http://customooxmlschemas.google.com/" xmlns:ahyp="http://schemas.microsoft.com/office/drawing/2018/hyperlinkcolor" xmlns:p15="http://schemas.microsoft.com/office/powerpoint/2012/main" xmlns:p14="http://schemas.microsoft.com/office/powerpoint/2010/main" xmlns:com="http://schemas.openxmlformats.org/drawingml/2006/compatibility" xmlns:pvml="urn:schemas-microsoft-com:office:powerpoint" xmlns:v="urn:schemas-microsoft-com:vml" xmlns:o="urn:schemas-microsoft-com:office:office" xmlns:dgm="http://schemas.openxmlformats.org/drawingml/2006/diagram" xmlns:c="http://schemas.openxmlformats.org/drawingml/2006/chart" xmlns:mv="urn:schemas-microsoft-com:mac:vml" xmlns:mc="http://schemas.openxmlformats.org/markup-compatibility/2006" xmlns="" r:id="rId9" roundtripDataSignature="AMtx7mg7/Uy38vozo7lv7lODiH/+yduhyA=="/>
     </p:ext>
   </p:extLst>
 </p:presentation>
@@ -12689,7 +12689,7 @@
         <p:spPr>
           <a:xfrm>
             <a:off x="6152914" y="1217060"/>
-            <a:ext cx="5909723" cy="2200562"/>
+            <a:ext cx="5909723" cy="2492950"/>
           </a:xfrm>
           <a:prstGeom prst="rect">
             <a:avLst/>
@@ -13002,7 +13002,72 @@
               </a:rPr>
               <a:t>TeleOp</a:t>
             </a:r>
-            <a:endParaRPr sz="1200" dirty="0"/>
+            <a:endParaRPr lang="en-US" b="0" i="0" u="none" strike="noStrike" cap="none" dirty="0">
+              <a:solidFill>
+                <a:srgbClr val="00B0F0"/>
+              </a:solidFill>
+              <a:latin typeface="Calibri"/>
+              <a:ea typeface="Calibri"/>
+              <a:cs typeface="Calibri"/>
+              <a:sym typeface="Calibri"/>
+            </a:endParaRPr>
+          </a:p>
+          <a:p>
+            <a:pPr marL="342900" indent="-342900">
+              <a:spcBef>
+                <a:spcPts val="600"/>
+              </a:spcBef>
+              <a:buClr>
+                <a:srgbClr val="00B0F0"/>
+              </a:buClr>
+              <a:buSzPts val="1600"/>
+              <a:buFont typeface="Calibri"/>
+              <a:buAutoNum type="arabicPeriod"/>
+            </a:pPr>
+            <a:r>
+              <a:rPr lang="en-US" dirty="0">
+                <a:solidFill>
+                  <a:srgbClr val="00B0F0"/>
+                </a:solidFill>
+                <a:latin typeface="Calibri"/>
+                <a:ea typeface="Calibri"/>
+                <a:cs typeface="Calibri"/>
+                <a:sym typeface="Calibri"/>
+              </a:rPr>
+              <a:t>Left Trigger, Right Trigger &amp; A to put robot </a:t>
+            </a:r>
+            <a:r>
+              <a:rPr lang="en-US" dirty="0" err="1">
+                <a:solidFill>
+                  <a:srgbClr val="00B0F0"/>
+                </a:solidFill>
+                <a:latin typeface="Calibri"/>
+                <a:ea typeface="Calibri"/>
+                <a:cs typeface="Calibri"/>
+                <a:sym typeface="Calibri"/>
+              </a:rPr>
+              <a:t>Tophat</a:t>
+            </a:r>
+            <a:r>
+              <a:rPr lang="en-US" dirty="0">
+                <a:solidFill>
+                  <a:srgbClr val="00B0F0"/>
+                </a:solidFill>
+                <a:latin typeface="Calibri"/>
+                <a:ea typeface="Calibri"/>
+                <a:cs typeface="Calibri"/>
+                <a:sym typeface="Calibri"/>
+              </a:rPr>
+              <a:t> in navigation mode</a:t>
+            </a:r>
+            <a:endParaRPr lang="en-US" dirty="0">
+              <a:solidFill>
+                <a:srgbClr val="00B0F0"/>
+              </a:solidFill>
+              <a:latin typeface="Calibri"/>
+              <a:ea typeface="Calibri"/>
+              <a:cs typeface="Calibri"/>
+            </a:endParaRPr>
           </a:p>
         </p:txBody>
       </p:sp>

</xml_diff>

<commit_message>
object optimization and code simplification
object optimization and code simplification
</commit_message>
<xml_diff>
--- a/ProgrammingDocs/Gamepad_AT_2022.pptx
+++ b/ProgrammingDocs/Gamepad_AT_2022.pptx
@@ -247,7 +247,7 @@
       <p15:sldGuideLst xmlns:p15="http://schemas.microsoft.com/office/powerpoint/2012/main"/>
     </p:ext>
     <p:ext uri="http://customooxmlschemas.google.com/">
-      <go:slidesCustomData xmlns:go="http://customooxmlschemas.google.com/" xmlns:ahyp="http://schemas.microsoft.com/office/drawing/2018/hyperlinkcolor" xmlns:p15="http://schemas.microsoft.com/office/powerpoint/2012/main" xmlns:p14="http://schemas.microsoft.com/office/powerpoint/2010/main" xmlns:com="http://schemas.openxmlformats.org/drawingml/2006/compatibility" xmlns:pvml="urn:schemas-microsoft-com:office:powerpoint" xmlns:v="urn:schemas-microsoft-com:vml" xmlns:o="urn:schemas-microsoft-com:office:office" xmlns:dgm="http://schemas.openxmlformats.org/drawingml/2006/diagram" xmlns:c="http://schemas.openxmlformats.org/drawingml/2006/chart" xmlns:mv="urn:schemas-microsoft-com:mac:vml" xmlns:mc="http://schemas.openxmlformats.org/markup-compatibility/2006" xmlns="" r:id="rId9" roundtripDataSignature="AMtx7mg7/Uy38vozo7lv7lODiH/+yduhyA=="/>
+      <go:slidesCustomData xmlns="" xmlns:mc="http://schemas.openxmlformats.org/markup-compatibility/2006" xmlns:mv="urn:schemas-microsoft-com:mac:vml" xmlns:c="http://schemas.openxmlformats.org/drawingml/2006/chart" xmlns:dgm="http://schemas.openxmlformats.org/drawingml/2006/diagram" xmlns:o="urn:schemas-microsoft-com:office:office" xmlns:v="urn:schemas-microsoft-com:vml" xmlns:pvml="urn:schemas-microsoft-com:office:powerpoint" xmlns:com="http://schemas.openxmlformats.org/drawingml/2006/compatibility" xmlns:p14="http://schemas.microsoft.com/office/powerpoint/2010/main" xmlns:p15="http://schemas.microsoft.com/office/powerpoint/2012/main" xmlns:ahyp="http://schemas.microsoft.com/office/drawing/2018/hyperlinkcolor" xmlns:go="http://customooxmlschemas.google.com/" r:id="rId9" roundtripDataSignature="AMtx7mg7/Uy38vozo7lv7lODiH/+yduhyA=="/>
     </p:ext>
   </p:extLst>
 </p:presentation>
@@ -12689,7 +12689,7 @@
         <p:spPr>
           <a:xfrm>
             <a:off x="6152914" y="1217060"/>
-            <a:ext cx="5909723" cy="2492950"/>
+            <a:ext cx="5909723" cy="1477287"/>
           </a:xfrm>
           <a:prstGeom prst="rect">
             <a:avLst/>
@@ -12735,7 +12735,31 @@
                 <a:cs typeface="Calibri"/>
                 <a:sym typeface="Calibri"/>
               </a:rPr>
-              <a:t>Left Bumper, Right Bumper &amp; A is to move to robo</a:t>
+              <a:t>Left Bumper, Right Bumper &amp; A is to </a:t>
+            </a:r>
+            <a:r>
+              <a:rPr lang="en-US" b="0" i="0" u="none" strike="noStrike" cap="none" dirty="0">
+                <a:solidFill>
+                  <a:srgbClr val="FF0000"/>
+                </a:solidFill>
+                <a:latin typeface="Calibri"/>
+                <a:ea typeface="Calibri"/>
+                <a:cs typeface="Calibri"/>
+                <a:sym typeface="Calibri"/>
+              </a:rPr>
+              <a:t>move to robo</a:t>
+            </a:r>
+            <a:r>
+              <a:rPr lang="en-US" dirty="0">
+                <a:solidFill>
+                  <a:srgbClr val="FF0000"/>
+                </a:solidFill>
+                <a:latin typeface="Calibri"/>
+                <a:ea typeface="Calibri"/>
+                <a:cs typeface="Calibri"/>
+                <a:sym typeface="Calibri"/>
+              </a:rPr>
+              <a:t>t </a:t>
             </a:r>
             <a:r>
               <a:rPr lang="en-US" dirty="0">
@@ -12747,19 +12771,7 @@
                 <a:cs typeface="Calibri"/>
                 <a:sym typeface="Calibri"/>
               </a:rPr>
-              <a:t>t in </a:t>
-            </a:r>
-            <a:r>
-              <a:rPr lang="en-US" dirty="0" err="1">
-                <a:solidFill>
-                  <a:srgbClr val="00B0F0"/>
-                </a:solidFill>
-                <a:latin typeface="Calibri"/>
-                <a:ea typeface="Calibri"/>
-                <a:cs typeface="Calibri"/>
-                <a:sym typeface="Calibri"/>
-              </a:rPr>
-              <a:t>Auton</a:t>
+              <a:t>in Auton</a:t>
             </a:r>
             <a:endParaRPr sz="1200" dirty="0"/>
           </a:p>
@@ -12791,7 +12803,7 @@
               <a:t>Left Bumper, Right Bumper &amp; X is to stop both platform &amp; </a:t>
             </a:r>
             <a:r>
-              <a:rPr lang="en-US" dirty="0" err="1">
+              <a:rPr lang="en-US" dirty="0">
                 <a:solidFill>
                   <a:srgbClr val="00B0F0"/>
                 </a:solidFill>
@@ -12803,7 +12815,7 @@
               <a:t>T</a:t>
             </a:r>
             <a:r>
-              <a:rPr lang="en-US" b="0" i="0" u="none" strike="noStrike" cap="none" dirty="0" err="1">
+              <a:rPr lang="en-US" b="0" i="0" u="none" strike="noStrike" cap="none" dirty="0">
                 <a:solidFill>
                   <a:srgbClr val="00B0F0"/>
                 </a:solidFill>
@@ -12875,144 +12887,6 @@
             <a:endParaRPr lang="en-US" sz="1200" dirty="0"/>
           </a:p>
           <a:p>
-            <a:pPr marL="342900" marR="0" lvl="0" indent="-342900" algn="l" rtl="0">
-              <a:spcBef>
-                <a:spcPts val="600"/>
-              </a:spcBef>
-              <a:spcAft>
-                <a:spcPts val="0"/>
-              </a:spcAft>
-              <a:buClr>
-                <a:srgbClr val="00B0F0"/>
-              </a:buClr>
-              <a:buSzPts val="1600"/>
-              <a:buFont typeface="Calibri"/>
-              <a:buAutoNum type="arabicPeriod"/>
-            </a:pPr>
-            <a:r>
-              <a:rPr lang="en-US" b="0" i="0" u="none" strike="noStrike" cap="none" dirty="0">
-                <a:solidFill>
-                  <a:srgbClr val="00B0F0"/>
-                </a:solidFill>
-                <a:latin typeface="Calibri"/>
-                <a:ea typeface="Calibri"/>
-                <a:cs typeface="Calibri"/>
-                <a:sym typeface="Calibri"/>
-              </a:rPr>
-              <a:t>Left Bumper, Right Bumper &amp; Y to resume High Junction Cone Pickup from </a:t>
-            </a:r>
-            <a:r>
-              <a:rPr lang="en-US" b="0" i="0" u="none" strike="noStrike" cap="none" dirty="0" err="1">
-                <a:solidFill>
-                  <a:srgbClr val="00B0F0"/>
-                </a:solidFill>
-                <a:latin typeface="Calibri"/>
-                <a:ea typeface="Calibri"/>
-                <a:cs typeface="Calibri"/>
-                <a:sym typeface="Calibri"/>
-              </a:rPr>
-              <a:t>Auton</a:t>
-            </a:r>
-            <a:r>
-              <a:rPr lang="en-US" b="0" i="0" u="none" strike="noStrike" cap="none" dirty="0">
-                <a:solidFill>
-                  <a:srgbClr val="00B0F0"/>
-                </a:solidFill>
-                <a:latin typeface="Calibri"/>
-                <a:ea typeface="Calibri"/>
-                <a:cs typeface="Calibri"/>
-                <a:sym typeface="Calibri"/>
-              </a:rPr>
-              <a:t> to </a:t>
-            </a:r>
-            <a:r>
-              <a:rPr lang="en-US" b="0" i="0" u="none" strike="noStrike" cap="none" dirty="0" err="1">
-                <a:solidFill>
-                  <a:srgbClr val="00B0F0"/>
-                </a:solidFill>
-                <a:latin typeface="Calibri"/>
-                <a:ea typeface="Calibri"/>
-                <a:cs typeface="Calibri"/>
-                <a:sym typeface="Calibri"/>
-              </a:rPr>
-              <a:t>TeleOp</a:t>
-            </a:r>
-            <a:endParaRPr sz="1200" dirty="0"/>
-          </a:p>
-          <a:p>
-            <a:pPr marL="342900" marR="0" lvl="0" indent="-342900" algn="l" rtl="0">
-              <a:spcBef>
-                <a:spcPts val="600"/>
-              </a:spcBef>
-              <a:spcAft>
-                <a:spcPts val="0"/>
-              </a:spcAft>
-              <a:buClr>
-                <a:srgbClr val="00B0F0"/>
-              </a:buClr>
-              <a:buSzPts val="1600"/>
-              <a:buFont typeface="Calibri"/>
-              <a:buAutoNum type="arabicPeriod"/>
-            </a:pPr>
-            <a:r>
-              <a:rPr lang="en-US" b="0" i="0" u="none" strike="noStrike" cap="none" dirty="0">
-                <a:solidFill>
-                  <a:srgbClr val="00B0F0"/>
-                </a:solidFill>
-                <a:latin typeface="Calibri"/>
-                <a:ea typeface="Calibri"/>
-                <a:cs typeface="Calibri"/>
-                <a:sym typeface="Calibri"/>
-              </a:rPr>
-              <a:t>Left Bumper, Right Bumper &amp; B to resume Medium Junction Cone Pickup from </a:t>
-            </a:r>
-            <a:r>
-              <a:rPr lang="en-US" b="0" i="0" u="none" strike="noStrike" cap="none" dirty="0" err="1">
-                <a:solidFill>
-                  <a:srgbClr val="00B0F0"/>
-                </a:solidFill>
-                <a:latin typeface="Calibri"/>
-                <a:ea typeface="Calibri"/>
-                <a:cs typeface="Calibri"/>
-                <a:sym typeface="Calibri"/>
-              </a:rPr>
-              <a:t>Auton</a:t>
-            </a:r>
-            <a:r>
-              <a:rPr lang="en-US" b="0" i="0" u="none" strike="noStrike" cap="none" dirty="0">
-                <a:solidFill>
-                  <a:srgbClr val="00B0F0"/>
-                </a:solidFill>
-                <a:latin typeface="Calibri"/>
-                <a:ea typeface="Calibri"/>
-                <a:cs typeface="Calibri"/>
-                <a:sym typeface="Calibri"/>
-              </a:rPr>
-              <a:t> to </a:t>
-            </a:r>
-            <a:r>
-              <a:rPr lang="en-US" b="0" i="0" u="none" strike="noStrike" cap="none" dirty="0" err="1">
-                <a:solidFill>
-                  <a:srgbClr val="00B0F0"/>
-                </a:solidFill>
-                <a:latin typeface="Calibri"/>
-                <a:ea typeface="Calibri"/>
-                <a:cs typeface="Calibri"/>
-                <a:sym typeface="Calibri"/>
-              </a:rPr>
-              <a:t>TeleOp</a:t>
-            </a:r>
-            <a:endParaRPr lang="en-US" b="0" i="0" u="none" strike="noStrike" cap="none" dirty="0">
-              <a:solidFill>
-                <a:srgbClr val="00B0F0"/>
-              </a:solidFill>
-              <a:latin typeface="Calibri"/>
-              <a:ea typeface="Calibri"/>
-              <a:cs typeface="Calibri"/>
-              <a:sym typeface="Calibri"/>
-            </a:endParaRPr>
-          </a:p>
-          <a:p>
             <a:pPr marL="342900" indent="-342900">
               <a:spcBef>
                 <a:spcPts val="600"/>
@@ -13034,31 +12908,7 @@
                 <a:cs typeface="Calibri"/>
                 <a:sym typeface="Calibri"/>
               </a:rPr>
-              <a:t>Left Trigger, Right Trigger &amp; A to put robot </a:t>
-            </a:r>
-            <a:r>
-              <a:rPr lang="en-US" dirty="0" err="1">
-                <a:solidFill>
-                  <a:srgbClr val="00B0F0"/>
-                </a:solidFill>
-                <a:latin typeface="Calibri"/>
-                <a:ea typeface="Calibri"/>
-                <a:cs typeface="Calibri"/>
-                <a:sym typeface="Calibri"/>
-              </a:rPr>
-              <a:t>Tophat</a:t>
-            </a:r>
-            <a:r>
-              <a:rPr lang="en-US" dirty="0">
-                <a:solidFill>
-                  <a:srgbClr val="00B0F0"/>
-                </a:solidFill>
-                <a:latin typeface="Calibri"/>
-                <a:ea typeface="Calibri"/>
-                <a:cs typeface="Calibri"/>
-                <a:sym typeface="Calibri"/>
-              </a:rPr>
-              <a:t> in navigation mode</a:t>
+              <a:t>Left Trigger, Right Trigger &amp; A to put robot Tophat in navigation mode</a:t>
             </a:r>
             <a:endParaRPr lang="en-US" dirty="0">
               <a:solidFill>
@@ -14640,8 +14490,8 @@
         </p:nvSpPr>
         <p:spPr>
           <a:xfrm>
-            <a:off x="6540609" y="549606"/>
-            <a:ext cx="5606205" cy="5863103"/>
+            <a:off x="6615688" y="545107"/>
+            <a:ext cx="5469476" cy="6293990"/>
           </a:xfrm>
           <a:prstGeom prst="rect">
             <a:avLst/>
@@ -15106,7 +14956,31 @@
                 <a:cs typeface="Calibri"/>
                 <a:sym typeface="Calibri"/>
               </a:rPr>
-              <a:t>Left Bumper, Right Bumper &amp; X is to preset for substation pickup</a:t>
+              <a:t>Left Bumper, Right Bumper &amp; X is to preset for </a:t>
+            </a:r>
+            <a:r>
+              <a:rPr lang="en-US" dirty="0">
+                <a:solidFill>
+                  <a:srgbClr val="FF0000"/>
+                </a:solidFill>
+                <a:latin typeface="Calibri"/>
+                <a:ea typeface="Calibri"/>
+                <a:cs typeface="Calibri"/>
+                <a:sym typeface="Calibri"/>
+              </a:rPr>
+              <a:t>substation</a:t>
+            </a:r>
+            <a:r>
+              <a:rPr lang="en-US" dirty="0">
+                <a:solidFill>
+                  <a:srgbClr val="00B0F0"/>
+                </a:solidFill>
+                <a:latin typeface="Calibri"/>
+                <a:ea typeface="Calibri"/>
+                <a:cs typeface="Calibri"/>
+                <a:sym typeface="Calibri"/>
+              </a:rPr>
+              <a:t> pickup</a:t>
             </a:r>
           </a:p>
           <a:p>
@@ -15131,21 +15005,20 @@
                 <a:cs typeface="Calibri"/>
                 <a:sym typeface="Calibri"/>
               </a:rPr>
-              <a:t>Left Bumper, Right Bumper &amp; Y is to preset for high junction drop</a:t>
+              <a:t>Left Bumper, Right Bumper &amp; Y is to preset for </a:t>
             </a:r>
-          </a:p>
-          <a:p>
-            <a:pPr marL="342900" indent="-342900">
-              <a:spcBef>
-                <a:spcPts val="600"/>
-              </a:spcBef>
-              <a:buClr>
-                <a:srgbClr val="00B0F0"/>
-              </a:buClr>
-              <a:buSzPts val="1400"/>
-              <a:buFont typeface="+mj-lt"/>
-              <a:buAutoNum type="arabicPeriod"/>
-            </a:pPr>
+            <a:r>
+              <a:rPr lang="en-US" dirty="0">
+                <a:solidFill>
+                  <a:srgbClr val="FF0000"/>
+                </a:solidFill>
+                <a:latin typeface="Calibri"/>
+                <a:ea typeface="Calibri"/>
+                <a:cs typeface="Calibri"/>
+                <a:sym typeface="Calibri"/>
+              </a:rPr>
+              <a:t>high junction </a:t>
+            </a:r>
             <a:r>
               <a:rPr lang="en-US" dirty="0">
                 <a:solidFill>
@@ -15156,7 +15029,7 @@
                 <a:cs typeface="Calibri"/>
                 <a:sym typeface="Calibri"/>
               </a:rPr>
-              <a:t>Left Bumper, Right Bumper &amp; B is to preset for medium junction drop</a:t>
+              <a:t>drop</a:t>
             </a:r>
           </a:p>
           <a:p>
@@ -15170,70 +15043,6 @@
               <a:buSzPts val="1400"/>
               <a:buFont typeface="+mj-lt"/>
               <a:buAutoNum type="arabicPeriod"/>
-            </a:pPr>
-            <a:r>
-              <a:rPr lang="en-US" dirty="0">
-                <a:solidFill>
-                  <a:srgbClr val="00B0F0"/>
-                </a:solidFill>
-                <a:latin typeface="Calibri"/>
-                <a:ea typeface="Calibri"/>
-                <a:cs typeface="Calibri"/>
-                <a:sym typeface="Calibri"/>
-              </a:rPr>
-              <a:t>Left Bumper, Right Bumper &amp; A is to preset for low/ground junction</a:t>
-            </a:r>
-          </a:p>
-        </p:txBody>
-      </p:sp>
-      <p:sp>
-        <p:nvSpPr>
-          <p:cNvPr id="3" name="Google Shape;122;p1">
-            <a:extLst>
-              <a:ext uri="{FF2B5EF4-FFF2-40B4-BE49-F238E27FC236}">
-                <a16:creationId xmlns:a16="http://schemas.microsoft.com/office/drawing/2014/main" id="{475EC5A9-E24E-DA2D-9FD5-8ED90C283CB8}"/>
-              </a:ext>
-            </a:extLst>
-          </p:cNvPr>
-          <p:cNvSpPr txBox="1"/>
-          <p:nvPr/>
-        </p:nvSpPr>
-        <p:spPr>
-          <a:xfrm>
-            <a:off x="491836" y="5090848"/>
-            <a:ext cx="5909723" cy="923289"/>
-          </a:xfrm>
-          <a:prstGeom prst="rect">
-            <a:avLst/>
-          </a:prstGeom>
-          <a:noFill/>
-          <a:ln w="9525" cap="flat" cmpd="sng">
-            <a:solidFill>
-              <a:srgbClr val="00B0F0"/>
-            </a:solidFill>
-            <a:prstDash val="solid"/>
-            <a:round/>
-            <a:headEnd type="none" w="sm" len="sm"/>
-            <a:tailEnd type="none" w="sm" len="sm"/>
-          </a:ln>
-        </p:spPr>
-        <p:txBody>
-          <a:bodyPr spcFirstLastPara="1" wrap="square" lIns="91425" tIns="45700" rIns="91425" bIns="45700" anchor="t" anchorCtr="0">
-            <a:spAutoFit/>
-          </a:bodyPr>
-          <a:lstStyle/>
-          <a:p>
-            <a:pPr marR="0" lvl="0" algn="l" rtl="0">
-              <a:spcBef>
-                <a:spcPts val="0"/>
-              </a:spcBef>
-              <a:spcAft>
-                <a:spcPts val="0"/>
-              </a:spcAft>
-              <a:buClr>
-                <a:srgbClr val="00B0F0"/>
-              </a:buClr>
-              <a:buSzPts val="1600"/>
             </a:pPr>
             <a:r>
               <a:rPr lang="en-US" b="0" i="0" u="none" strike="noStrike" cap="none" dirty="0">
@@ -15245,59 +15054,19 @@
                 <a:cs typeface="Calibri"/>
                 <a:sym typeface="Calibri"/>
               </a:rPr>
-              <a:t>21. Left Trigger, Right Trigger &amp; X to pickup and ready to drop in any junction</a:t>
+              <a:t>Left Trigger, Right Trigger &amp; X to </a:t>
             </a:r>
-            <a:endParaRPr lang="en-US" sz="1200" dirty="0">
-              <a:ea typeface="Calibri"/>
-            </a:endParaRPr>
-          </a:p>
-          <a:p>
-            <a:pPr marR="0" lvl="0" algn="l" rtl="0">
-              <a:spcBef>
-                <a:spcPts val="0"/>
-              </a:spcBef>
-              <a:spcAft>
-                <a:spcPts val="0"/>
-              </a:spcAft>
-              <a:buClr>
-                <a:srgbClr val="00B0F0"/>
-              </a:buClr>
-              <a:buSzPts val="1600"/>
-            </a:pPr>
-            <a:endParaRPr lang="en-US" sz="1200" b="0" i="0" u="none" strike="noStrike" cap="none" dirty="0">
-              <a:solidFill>
-                <a:srgbClr val="00B0F0"/>
-              </a:solidFill>
-              <a:latin typeface="Calibri"/>
-              <a:ea typeface="Calibri"/>
-              <a:cs typeface="Calibri"/>
-              <a:sym typeface="Calibri"/>
-            </a:endParaRPr>
-          </a:p>
-          <a:p>
-            <a:pPr marR="0" lvl="0" algn="l" rtl="0">
-              <a:spcBef>
-                <a:spcPts val="0"/>
-              </a:spcBef>
-              <a:spcAft>
-                <a:spcPts val="0"/>
-              </a:spcAft>
-              <a:buClr>
-                <a:srgbClr val="00B0F0"/>
-              </a:buClr>
-              <a:buSzPts val="1600"/>
-            </a:pPr>
             <a:r>
-              <a:rPr lang="en-US" sz="1200" dirty="0">
+              <a:rPr lang="en-US" b="0" i="0" u="none" strike="noStrike" cap="none" dirty="0">
                 <a:solidFill>
-                  <a:srgbClr val="00B0F0"/>
+                  <a:srgbClr val="FF0000"/>
                 </a:solidFill>
                 <a:latin typeface="Calibri"/>
                 <a:ea typeface="Calibri"/>
                 <a:cs typeface="Calibri"/>
                 <a:sym typeface="Calibri"/>
               </a:rPr>
-              <a:t>22. </a:t>
+              <a:t>substation</a:t>
             </a:r>
             <a:r>
               <a:rPr lang="en-US" b="0" i="0" u="none" strike="noStrike" cap="none" dirty="0">
@@ -15309,9 +15078,66 @@
                 <a:cs typeface="Calibri"/>
                 <a:sym typeface="Calibri"/>
               </a:rPr>
-              <a:t>Left Trigger, Right Trigger &amp; Y to drop in high junction from substation continuously</a:t>
+              <a:t> pickup and ready to drop in any junction</a:t>
             </a:r>
-            <a:endParaRPr lang="en-US" sz="1200" dirty="0"/>
+          </a:p>
+          <a:p>
+            <a:pPr marL="342900" indent="-342900">
+              <a:spcBef>
+                <a:spcPts val="600"/>
+              </a:spcBef>
+              <a:buClr>
+                <a:srgbClr val="00B0F0"/>
+              </a:buClr>
+              <a:buSzPts val="1400"/>
+              <a:buFont typeface="+mj-lt"/>
+              <a:buAutoNum type="arabicPeriod"/>
+            </a:pPr>
+            <a:r>
+              <a:rPr lang="en-US" b="0" i="0" u="none" strike="noStrike" cap="none" dirty="0">
+                <a:solidFill>
+                  <a:srgbClr val="00B0F0"/>
+                </a:solidFill>
+                <a:latin typeface="Calibri"/>
+                <a:ea typeface="Calibri"/>
+                <a:cs typeface="Calibri"/>
+                <a:sym typeface="Calibri"/>
+              </a:rPr>
+              <a:t>Left Trigger, Right Trigger &amp; Y to drop in high junction from </a:t>
+            </a:r>
+            <a:r>
+              <a:rPr lang="en-US" b="0" i="0" u="none" strike="noStrike" cap="none" dirty="0">
+                <a:solidFill>
+                  <a:srgbClr val="FF0000"/>
+                </a:solidFill>
+                <a:latin typeface="Calibri"/>
+                <a:ea typeface="Calibri"/>
+                <a:cs typeface="Calibri"/>
+                <a:sym typeface="Calibri"/>
+              </a:rPr>
+              <a:t>substation</a:t>
+            </a:r>
+            <a:r>
+              <a:rPr lang="en-US" b="0" i="0" u="none" strike="noStrike" cap="none" dirty="0">
+                <a:solidFill>
+                  <a:srgbClr val="00B0F0"/>
+                </a:solidFill>
+                <a:latin typeface="Calibri"/>
+                <a:ea typeface="Calibri"/>
+                <a:cs typeface="Calibri"/>
+                <a:sym typeface="Calibri"/>
+              </a:rPr>
+              <a:t> continuously</a:t>
+            </a:r>
+            <a:endParaRPr lang="en-US" dirty="0">
+              <a:solidFill>
+                <a:srgbClr val="00B0F0"/>
+              </a:solidFill>
+              <a:latin typeface="Calibri"/>
+              <a:ea typeface="Calibri"/>
+              <a:cs typeface="Calibri"/>
+              <a:sym typeface="Calibri"/>
+            </a:endParaRPr>
           </a:p>
         </p:txBody>
       </p:sp>

</xml_diff>

<commit_message>
fix blue alliance left
fix blue alliance left final tweaks
</commit_message>
<xml_diff>
--- a/ProgrammingDocs/Gamepad_AT_2022.pptx
+++ b/ProgrammingDocs/Gamepad_AT_2022.pptx
@@ -12689,7 +12689,7 @@
         <p:spPr>
           <a:xfrm>
             <a:off x="6152914" y="1217060"/>
-            <a:ext cx="5909723" cy="1477287"/>
+            <a:ext cx="5909723" cy="1692731"/>
           </a:xfrm>
           <a:prstGeom prst="rect">
             <a:avLst/>
@@ -12747,7 +12747,7 @@
                 <a:cs typeface="Calibri"/>
                 <a:sym typeface="Calibri"/>
               </a:rPr>
-              <a:t>move to robo</a:t>
+              <a:t>move robo</a:t>
             </a:r>
             <a:r>
               <a:rPr lang="en-US" dirty="0">
@@ -12771,7 +12771,7 @@
                 <a:cs typeface="Calibri"/>
                 <a:sym typeface="Calibri"/>
               </a:rPr>
-              <a:t>in Auton</a:t>
+              <a:t>into Substation Pickup (*** robot has to stay close to your alliance zone for auto positioning)</a:t>
             </a:r>
             <a:endParaRPr sz="1200" dirty="0"/>
           </a:p>

</xml_diff>